<commit_message>
actualizacion del archivo raml separando los response y agregando un enum | actualizacion de readme.md | separacion de los flujos del archivo principal | actualizacion del archivo de presentacion del proyecto
</commit_message>
<xml_diff>
--- a/docs/DOCUMENTACION DEL PROYECTO.pptx
+++ b/docs/DOCUMENTACION DEL PROYECTO.pptx
@@ -11,7 +11,7 @@
     <p:sldId id="259" r:id="rId5"/>
     <p:sldId id="258" r:id="rId6"/>
     <p:sldId id="260" r:id="rId7"/>
-    <p:sldId id="261" r:id="rId8"/>
+    <p:sldId id="271" r:id="rId8"/>
   </p:sldIdLst>
   <p:sldSz cx="12192000" cy="6858000"/>
   <p:notesSz cx="6858000" cy="9144000"/>
@@ -3381,31 +3381,6 @@
           </a:p>
         </p:txBody>
       </p:sp>
-      <p:sp>
-        <p:nvSpPr>
-          <p:cNvPr id="3" name="Subtítulo 2">
-            <a:extLst>
-              <a:ext uri="{FF2B5EF4-FFF2-40B4-BE49-F238E27FC236}">
-                <a16:creationId xmlns:a16="http://schemas.microsoft.com/office/drawing/2014/main" id="{D51FBC4E-027C-4302-835C-957C8E034BF8}"/>
-              </a:ext>
-            </a:extLst>
-          </p:cNvPr>
-          <p:cNvSpPr>
-            <a:spLocks noGrp="1"/>
-          </p:cNvSpPr>
-          <p:nvPr>
-            <p:ph type="subTitle" idx="1"/>
-          </p:nvPr>
-        </p:nvSpPr>
-        <p:spPr/>
-        <p:txBody>
-          <a:bodyPr/>
-          <a:lstStyle/>
-          <a:p>
-            <a:endParaRPr lang="es-MX"/>
-          </a:p>
-        </p:txBody>
-      </p:sp>
     </p:spTree>
     <p:extLst>
       <p:ext uri="{BB962C8B-B14F-4D97-AF65-F5344CB8AC3E}">
@@ -6768,10 +6743,127 @@
           <a:chExt cx="0" cy="0"/>
         </a:xfrm>
       </p:grpSpPr>
+      <p:sp>
+        <p:nvSpPr>
+          <p:cNvPr id="2" name="Título 1">
+            <a:extLst>
+              <a:ext uri="{FF2B5EF4-FFF2-40B4-BE49-F238E27FC236}">
+                <a16:creationId xmlns:a16="http://schemas.microsoft.com/office/drawing/2014/main" id="{FCE22034-7617-4D64-98DF-7FC5CE40C30C}"/>
+              </a:ext>
+            </a:extLst>
+          </p:cNvPr>
+          <p:cNvSpPr>
+            <a:spLocks noGrp="1"/>
+          </p:cNvSpPr>
+          <p:nvPr>
+            <p:ph type="title"/>
+          </p:nvPr>
+        </p:nvSpPr>
+        <p:spPr/>
+        <p:txBody>
+          <a:bodyPr/>
+          <a:lstStyle/>
+          <a:p>
+            <a:r>
+              <a:rPr lang="es-MX" dirty="0"/>
+              <a:t>Mejoras finales</a:t>
+            </a:r>
+          </a:p>
+        </p:txBody>
+      </p:sp>
+      <p:sp>
+        <p:nvSpPr>
+          <p:cNvPr id="3" name="Marcador de contenido 2">
+            <a:extLst>
+              <a:ext uri="{FF2B5EF4-FFF2-40B4-BE49-F238E27FC236}">
+                <a16:creationId xmlns:a16="http://schemas.microsoft.com/office/drawing/2014/main" id="{6BDEF4DD-BB1C-4C23-9A09-3F7641E9D732}"/>
+              </a:ext>
+            </a:extLst>
+          </p:cNvPr>
+          <p:cNvSpPr>
+            <a:spLocks noGrp="1"/>
+          </p:cNvSpPr>
+          <p:nvPr>
+            <p:ph idx="1"/>
+          </p:nvPr>
+        </p:nvSpPr>
+        <p:spPr/>
+        <p:txBody>
+          <a:bodyPr/>
+          <a:lstStyle/>
+          <a:p>
+            <a:r>
+              <a:rPr lang="es-MX" dirty="0"/>
+              <a:t>Se crea el archivo console-flow.xml separando el flujo de la consola</a:t>
+            </a:r>
+          </a:p>
+          <a:p>
+            <a:r>
+              <a:rPr lang="es-MX" dirty="0"/>
+              <a:t>Se actualiza el archivo readme.md proporcionando información del proyecto</a:t>
+            </a:r>
+          </a:p>
+          <a:p>
+            <a:r>
+              <a:rPr lang="es-MX" dirty="0"/>
+              <a:t>Se separa el manejo de errores a error-handler.xml</a:t>
+            </a:r>
+          </a:p>
+          <a:p>
+            <a:r>
+              <a:rPr lang="es-MX" dirty="0"/>
+              <a:t>Se crean los ejemplos de respuesta en la carpeta </a:t>
+            </a:r>
+            <a:r>
+              <a:rPr lang="es-MX" dirty="0" err="1"/>
+              <a:t>samples</a:t>
+            </a:r>
+            <a:r>
+              <a:rPr lang="es-MX" dirty="0"/>
+              <a:t>/</a:t>
+            </a:r>
+          </a:p>
+          <a:p>
+            <a:r>
+              <a:rPr lang="es-MX" dirty="0"/>
+              <a:t>Se actualiza el archivo </a:t>
+            </a:r>
+            <a:r>
+              <a:rPr lang="es-MX" dirty="0" err="1"/>
+              <a:t>starwars-characters-api.raml</a:t>
+            </a:r>
+            <a:r>
+              <a:rPr lang="es-MX" dirty="0"/>
+              <a:t> con los simples y se agrega un </a:t>
+            </a:r>
+            <a:r>
+              <a:rPr lang="es-MX" dirty="0" err="1"/>
+              <a:t>enum</a:t>
+            </a:r>
+            <a:r>
+              <a:rPr lang="es-MX" dirty="0"/>
+              <a:t> con los parámetros permitidos por la </a:t>
+            </a:r>
+            <a:r>
+              <a:rPr lang="es-MX" dirty="0" err="1"/>
+              <a:t>swapi</a:t>
+            </a:r>
+            <a:r>
+              <a:rPr lang="es-MX" dirty="0"/>
+              <a:t> en el apartado </a:t>
+            </a:r>
+            <a:r>
+              <a:rPr lang="es-MX" dirty="0" err="1"/>
+              <a:t>gender</a:t>
+            </a:r>
+            <a:endParaRPr lang="es-MX" dirty="0"/>
+          </a:p>
+        </p:txBody>
+      </p:sp>
     </p:spTree>
     <p:extLst>
       <p:ext uri="{BB962C8B-B14F-4D97-AF65-F5344CB8AC3E}">
-        <p14:creationId xmlns:p14="http://schemas.microsoft.com/office/powerpoint/2010/main" val="2859980804"/>
+        <p14:creationId xmlns:p14="http://schemas.microsoft.com/office/powerpoint/2010/main" val="938745078"/>
       </p:ext>
     </p:extLst>
   </p:cSld>

</xml_diff>